<commit_message>
Updated ppt after Sunday meeting
Changed flow of slides 1-5 in ppt folder. And amended some content based on feedback from 2 Jan meeting.
</commit_message>
<xml_diff>
--- a/ppt/WY added.pptx
+++ b/ppt/WY added.pptx
@@ -470,7 +470,7 @@
           <a:p>
             <a:fld id="{B5D7434C-48CE-114A-AD66-A0A76C8863DC}" type="datetimeFigureOut">
               <a:rPr lang="en-US" smtClean="0"/>
-              <a:t>12/28/21</a:t>
+              <a:t>1/2/22</a:t>
             </a:fld>
             <a:endParaRPr lang="en-US"/>
           </a:p>
@@ -1680,7 +1680,7 @@
             <a:fld id="{87DE6118-2437-4B30-8E3C-4D2BE6020583}" type="datetimeFigureOut">
               <a:rPr lang="en-US" dirty="0"/>
               <a:pPr/>
-              <a:t>12/28/21</a:t>
+              <a:t>1/2/22</a:t>
             </a:fld>
             <a:endParaRPr lang="en-US" dirty="0"/>
           </a:p>
@@ -2006,7 +2006,7 @@
           <a:p>
             <a:fld id="{87DE6118-2437-4B30-8E3C-4D2BE6020583}" type="datetimeFigureOut">
               <a:rPr lang="en-US" dirty="0"/>
-              <a:t>12/28/21</a:t>
+              <a:t>1/2/22</a:t>
             </a:fld>
             <a:endParaRPr lang="en-US" dirty="0"/>
           </a:p>
@@ -2181,7 +2181,7 @@
           <a:p>
             <a:fld id="{87DE6118-2437-4B30-8E3C-4D2BE6020583}" type="datetimeFigureOut">
               <a:rPr lang="en-US" dirty="0"/>
-              <a:t>12/28/21</a:t>
+              <a:t>1/2/22</a:t>
             </a:fld>
             <a:endParaRPr lang="en-US" dirty="0"/>
           </a:p>
@@ -2392,7 +2392,7 @@
           <a:p>
             <a:fld id="{87DE6118-2437-4B30-8E3C-4D2BE6020583}" type="datetimeFigureOut">
               <a:rPr lang="en-US" dirty="0"/>
-              <a:t>12/28/21</a:t>
+              <a:t>1/2/22</a:t>
             </a:fld>
             <a:endParaRPr lang="en-US" dirty="0"/>
           </a:p>
@@ -2675,7 +2675,7 @@
             <a:fld id="{87DE6118-2437-4B30-8E3C-4D2BE6020583}" type="datetimeFigureOut">
               <a:rPr lang="en-US" dirty="0"/>
               <a:pPr/>
-              <a:t>12/28/21</a:t>
+              <a:t>1/2/22</a:t>
             </a:fld>
             <a:endParaRPr lang="en-US" dirty="0"/>
           </a:p>
@@ -3065,7 +3065,7 @@
           <a:p>
             <a:fld id="{87DE6118-2437-4B30-8E3C-4D2BE6020583}" type="datetimeFigureOut">
               <a:rPr lang="en-US" dirty="0"/>
-              <a:t>12/28/21</a:t>
+              <a:t>1/2/22</a:t>
             </a:fld>
             <a:endParaRPr lang="en-US" dirty="0"/>
           </a:p>
@@ -3537,7 +3537,7 @@
           <a:p>
             <a:fld id="{87DE6118-2437-4B30-8E3C-4D2BE6020583}" type="datetimeFigureOut">
               <a:rPr lang="en-US" dirty="0"/>
-              <a:t>12/28/21</a:t>
+              <a:t>1/2/22</a:t>
             </a:fld>
             <a:endParaRPr lang="en-US" dirty="0"/>
           </a:p>
@@ -3650,7 +3650,7 @@
           <a:p>
             <a:fld id="{87DE6118-2437-4B30-8E3C-4D2BE6020583}" type="datetimeFigureOut">
               <a:rPr lang="en-US" dirty="0"/>
-              <a:t>12/28/21</a:t>
+              <a:t>1/2/22</a:t>
             </a:fld>
             <a:endParaRPr lang="en-US" dirty="0"/>
           </a:p>
@@ -3740,7 +3740,7 @@
           <a:p>
             <a:fld id="{87DE6118-2437-4B30-8E3C-4D2BE6020583}" type="datetimeFigureOut">
               <a:rPr lang="en-US" dirty="0"/>
-              <a:t>12/28/21</a:t>
+              <a:t>1/2/22</a:t>
             </a:fld>
             <a:endParaRPr lang="en-US" dirty="0"/>
           </a:p>
@@ -4082,7 +4082,7 @@
             <a:fld id="{87DE6118-2437-4B30-8E3C-4D2BE6020583}" type="datetimeFigureOut">
               <a:rPr lang="en-US" dirty="0"/>
               <a:pPr/>
-              <a:t>12/28/21</a:t>
+              <a:t>1/2/22</a:t>
             </a:fld>
             <a:endParaRPr lang="en-US" dirty="0"/>
           </a:p>
@@ -4467,7 +4467,7 @@
             <a:fld id="{87DE6118-2437-4B30-8E3C-4D2BE6020583}" type="datetimeFigureOut">
               <a:rPr lang="en-US" dirty="0"/>
               <a:pPr/>
-              <a:t>12/28/21</a:t>
+              <a:t>1/2/22</a:t>
             </a:fld>
             <a:endParaRPr lang="en-US" dirty="0"/>
           </a:p>
@@ -4742,7 +4742,7 @@
             <a:fld id="{87DE6118-2437-4B30-8E3C-4D2BE6020583}" type="datetimeFigureOut">
               <a:rPr lang="en-US" dirty="0"/>
               <a:pPr/>
-              <a:t>12/28/21</a:t>
+              <a:t>1/2/22</a:t>
             </a:fld>
             <a:endParaRPr lang="en-US" dirty="0"/>
           </a:p>
@@ -5833,8 +5833,8 @@
           </a:p>
         </p:txBody>
       </p:sp>
-      <mc:AlternateContent xmlns:mc="http://schemas.openxmlformats.org/markup-compatibility/2006">
-        <mc:Choice xmlns:p14="http://schemas.microsoft.com/office/powerpoint/2010/main" Requires="p14">
+      <mc:AlternateContent xmlns:mc="http://schemas.openxmlformats.org/markup-compatibility/2006" xmlns:p14="http://schemas.microsoft.com/office/powerpoint/2010/main">
+        <mc:Choice Requires="p14">
           <p:contentPart p14:bwMode="auto" r:id="rId3">
             <p14:nvContentPartPr>
               <p14:cNvPr id="10" name="Ink 9">
@@ -5853,7 +5853,7 @@
             </p14:xfrm>
           </p:contentPart>
         </mc:Choice>
-        <mc:Fallback>
+        <mc:Fallback xmlns="">
           <p:pic>
             <p:nvPicPr>
               <p:cNvPr id="10" name="Ink 9">
@@ -5884,8 +5884,8 @@
           </p:pic>
         </mc:Fallback>
       </mc:AlternateContent>
-      <mc:AlternateContent xmlns:mc="http://schemas.openxmlformats.org/markup-compatibility/2006">
-        <mc:Choice xmlns:p14="http://schemas.microsoft.com/office/powerpoint/2010/main" Requires="p14">
+      <mc:AlternateContent xmlns:mc="http://schemas.openxmlformats.org/markup-compatibility/2006" xmlns:p14="http://schemas.microsoft.com/office/powerpoint/2010/main">
+        <mc:Choice Requires="p14">
           <p:contentPart p14:bwMode="auto" r:id="rId5">
             <p14:nvContentPartPr>
               <p14:cNvPr id="11" name="Ink 10">
@@ -5904,7 +5904,7 @@
             </p14:xfrm>
           </p:contentPart>
         </mc:Choice>
-        <mc:Fallback>
+        <mc:Fallback xmlns="">
           <p:pic>
             <p:nvPicPr>
               <p:cNvPr id="11" name="Ink 10">
@@ -6263,8 +6263,8 @@
           </a:prstGeom>
         </p:spPr>
       </p:pic>
-      <mc:AlternateContent xmlns:mc="http://schemas.openxmlformats.org/markup-compatibility/2006">
-        <mc:Choice xmlns:p14="http://schemas.microsoft.com/office/powerpoint/2010/main" Requires="p14">
+      <mc:AlternateContent xmlns:mc="http://schemas.openxmlformats.org/markup-compatibility/2006" xmlns:p14="http://schemas.microsoft.com/office/powerpoint/2010/main">
+        <mc:Choice Requires="p14">
           <p:contentPart p14:bwMode="auto" r:id="rId3">
             <p14:nvContentPartPr>
               <p14:cNvPr id="6" name="Ink 5">
@@ -6283,7 +6283,7 @@
             </p14:xfrm>
           </p:contentPart>
         </mc:Choice>
-        <mc:Fallback>
+        <mc:Fallback xmlns="">
           <p:pic>
             <p:nvPicPr>
               <p:cNvPr id="6" name="Ink 5">
@@ -6314,8 +6314,8 @@
           </p:pic>
         </mc:Fallback>
       </mc:AlternateContent>
-      <mc:AlternateContent xmlns:mc="http://schemas.openxmlformats.org/markup-compatibility/2006">
-        <mc:Choice xmlns:p14="http://schemas.microsoft.com/office/powerpoint/2010/main" Requires="p14">
+      <mc:AlternateContent xmlns:mc="http://schemas.openxmlformats.org/markup-compatibility/2006" xmlns:p14="http://schemas.microsoft.com/office/powerpoint/2010/main">
+        <mc:Choice Requires="p14">
           <p:contentPart p14:bwMode="auto" r:id="rId5">
             <p14:nvContentPartPr>
               <p14:cNvPr id="7" name="Ink 6">
@@ -6334,7 +6334,7 @@
             </p14:xfrm>
           </p:contentPart>
         </mc:Choice>
-        <mc:Fallback>
+        <mc:Fallback xmlns="">
           <p:pic>
             <p:nvPicPr>
               <p:cNvPr id="7" name="Ink 6">
@@ -7136,8 +7136,8 @@
           </a:prstGeom>
         </p:spPr>
       </p:pic>
-      <mc:AlternateContent xmlns:mc="http://schemas.openxmlformats.org/markup-compatibility/2006">
-        <mc:Choice xmlns:p14="http://schemas.microsoft.com/office/powerpoint/2010/main" Requires="p14">
+      <mc:AlternateContent xmlns:mc="http://schemas.openxmlformats.org/markup-compatibility/2006" xmlns:p14="http://schemas.microsoft.com/office/powerpoint/2010/main">
+        <mc:Choice Requires="p14">
           <p:contentPart p14:bwMode="auto" r:id="rId3">
             <p14:nvContentPartPr>
               <p14:cNvPr id="6" name="Ink 5">
@@ -7156,7 +7156,7 @@
             </p14:xfrm>
           </p:contentPart>
         </mc:Choice>
-        <mc:Fallback>
+        <mc:Fallback xmlns="">
           <p:pic>
             <p:nvPicPr>
               <p:cNvPr id="6" name="Ink 5">
@@ -7187,8 +7187,8 @@
           </p:pic>
         </mc:Fallback>
       </mc:AlternateContent>
-      <mc:AlternateContent xmlns:mc="http://schemas.openxmlformats.org/markup-compatibility/2006">
-        <mc:Choice xmlns:p14="http://schemas.microsoft.com/office/powerpoint/2010/main" Requires="p14">
+      <mc:AlternateContent xmlns:mc="http://schemas.openxmlformats.org/markup-compatibility/2006" xmlns:p14="http://schemas.microsoft.com/office/powerpoint/2010/main">
+        <mc:Choice Requires="p14">
           <p:contentPart p14:bwMode="auto" r:id="rId5">
             <p14:nvContentPartPr>
               <p14:cNvPr id="7" name="Ink 6">
@@ -7207,7 +7207,7 @@
             </p14:xfrm>
           </p:contentPart>
         </mc:Choice>
-        <mc:Fallback>
+        <mc:Fallback xmlns="">
           <p:pic>
             <p:nvPicPr>
               <p:cNvPr id="7" name="Ink 6">
@@ -7377,8 +7377,8 @@
           </a:prstGeom>
         </p:spPr>
       </p:pic>
-      <mc:AlternateContent xmlns:mc="http://schemas.openxmlformats.org/markup-compatibility/2006">
-        <mc:Choice xmlns:p14="http://schemas.microsoft.com/office/powerpoint/2010/main" Requires="p14">
+      <mc:AlternateContent xmlns:mc="http://schemas.openxmlformats.org/markup-compatibility/2006" xmlns:p14="http://schemas.microsoft.com/office/powerpoint/2010/main">
+        <mc:Choice Requires="p14">
           <p:contentPart p14:bwMode="auto" r:id="rId3">
             <p14:nvContentPartPr>
               <p14:cNvPr id="6" name="Ink 5">
@@ -7397,7 +7397,7 @@
             </p14:xfrm>
           </p:contentPart>
         </mc:Choice>
-        <mc:Fallback>
+        <mc:Fallback xmlns="">
           <p:pic>
             <p:nvPicPr>
               <p:cNvPr id="6" name="Ink 5">
@@ -7428,8 +7428,8 @@
           </p:pic>
         </mc:Fallback>
       </mc:AlternateContent>
-      <mc:AlternateContent xmlns:mc="http://schemas.openxmlformats.org/markup-compatibility/2006">
-        <mc:Choice xmlns:p14="http://schemas.microsoft.com/office/powerpoint/2010/main" Requires="p14">
+      <mc:AlternateContent xmlns:mc="http://schemas.openxmlformats.org/markup-compatibility/2006" xmlns:p14="http://schemas.microsoft.com/office/powerpoint/2010/main">
+        <mc:Choice Requires="p14">
           <p:contentPart p14:bwMode="auto" r:id="rId5">
             <p14:nvContentPartPr>
               <p14:cNvPr id="7" name="Ink 6">
@@ -7448,7 +7448,7 @@
             </p14:xfrm>
           </p:contentPart>
         </mc:Choice>
-        <mc:Fallback>
+        <mc:Fallback xmlns="">
           <p:pic>
             <p:nvPicPr>
               <p:cNvPr id="7" name="Ink 6">
@@ -9119,16 +9119,15 @@
             <p:ph idx="1"/>
           </p:nvPr>
         </p:nvPicPr>
-        <p:blipFill>
+        <p:blipFill rotWithShape="1">
           <a:blip r:embed="rId3"/>
-          <a:stretch>
-            <a:fillRect/>
-          </a:stretch>
+          <a:srcRect b="43857"/>
+          <a:stretch/>
         </p:blipFill>
         <p:spPr>
           <a:xfrm>
             <a:off x="5398818" y="1535125"/>
-            <a:ext cx="6529470" cy="5050346"/>
+            <a:ext cx="6529470" cy="2835397"/>
           </a:xfrm>
         </p:spPr>
       </p:pic>
@@ -9147,7 +9146,7 @@
         <p:spPr>
           <a:xfrm>
             <a:off x="1371599" y="2262753"/>
-            <a:ext cx="4114801" cy="3416320"/>
+            <a:ext cx="4114801" cy="2677656"/>
           </a:xfrm>
           <a:prstGeom prst="rect">
             <a:avLst/>
@@ -9241,38 +9240,6 @@
               <a:buFont typeface="Arial" panose="020B0604020202020204" pitchFamily="34" charset="0"/>
               <a:buChar char="•"/>
             </a:pPr>
-            <a:r>
-              <a:rPr lang="en-US" sz="2400" dirty="0">
-                <a:solidFill>
-                  <a:srgbClr val="C00000"/>
-                </a:solidFill>
-                <a:latin typeface="Calibri" panose="020F0502020204030204" pitchFamily="34" charset="0"/>
-                <a:cs typeface="Calibri" panose="020F0502020204030204" pitchFamily="34" charset="0"/>
-              </a:rPr>
-              <a:t>&lt;select&gt;</a:t>
-            </a:r>
-          </a:p>
-          <a:p>
-            <a:pPr marL="285750" indent="-285750">
-              <a:buFont typeface="Arial" panose="020B0604020202020204" pitchFamily="34" charset="0"/>
-              <a:buChar char="•"/>
-            </a:pPr>
-            <a:r>
-              <a:rPr lang="en-US" sz="2400" dirty="0">
-                <a:solidFill>
-                  <a:srgbClr val="C00000"/>
-                </a:solidFill>
-                <a:latin typeface="Calibri" panose="020F0502020204030204" pitchFamily="34" charset="0"/>
-                <a:cs typeface="Calibri" panose="020F0502020204030204" pitchFamily="34" charset="0"/>
-              </a:rPr>
-              <a:t>&lt;option&gt;</a:t>
-            </a:r>
-          </a:p>
-          <a:p>
-            <a:pPr marL="285750" indent="-285750">
-              <a:buFont typeface="Arial" panose="020B0604020202020204" pitchFamily="34" charset="0"/>
-              <a:buChar char="•"/>
-            </a:pPr>
             <a:endParaRPr lang="en-US" sz="2400" dirty="0">
               <a:latin typeface="Calibri" panose="020F0502020204030204" pitchFamily="34" charset="0"/>
               <a:cs typeface="Calibri" panose="020F0502020204030204" pitchFamily="34" charset="0"/>
@@ -9280,6 +9247,35 @@
           </a:p>
         </p:txBody>
       </p:sp>
+      <p:pic>
+        <p:nvPicPr>
+          <p:cNvPr id="7" name="Content Placeholder 4" descr="Graphical user interface, application&#10;&#10;Description automatically generated">
+            <a:extLst>
+              <a:ext uri="{FF2B5EF4-FFF2-40B4-BE49-F238E27FC236}">
+                <a16:creationId xmlns:a16="http://schemas.microsoft.com/office/drawing/2014/main" id="{C90674DC-458C-1F4C-AE53-6DAD2EA6E0EB}"/>
+              </a:ext>
+            </a:extLst>
+          </p:cNvPr>
+          <p:cNvPicPr>
+            <a:picLocks noChangeAspect="1"/>
+          </p:cNvPicPr>
+          <p:nvPr/>
+        </p:nvPicPr>
+        <p:blipFill rotWithShape="1">
+          <a:blip r:embed="rId3"/>
+          <a:srcRect t="75240"/>
+          <a:stretch/>
+        </p:blipFill>
+        <p:spPr>
+          <a:xfrm>
+            <a:off x="5398818" y="4370522"/>
+            <a:ext cx="6529470" cy="1250476"/>
+          </a:xfrm>
+          <a:prstGeom prst="rect">
+            <a:avLst/>
+          </a:prstGeom>
+        </p:spPr>
+      </p:pic>
     </p:spTree>
     <p:extLst>
       <p:ext uri="{BB962C8B-B14F-4D97-AF65-F5344CB8AC3E}">

</xml_diff>